<commit_message>
new tech slideshow final
</commit_message>
<xml_diff>
--- a/newTech/slideshow.pptx
+++ b/newTech/slideshow.pptx
@@ -5,7 +5,7 @@
     <p:sldMasterId id="2147483678" r:id="rId1"/>
   </p:sldMasterIdLst>
   <p:notesMasterIdLst>
-    <p:notesMasterId r:id="rId33"/>
+    <p:notesMasterId r:id="rId35"/>
   </p:notesMasterIdLst>
   <p:sldIdLst>
     <p:sldId id="256" r:id="rId2"/>
@@ -39,6 +39,8 @@
     <p:sldId id="287" r:id="rId30"/>
     <p:sldId id="286" r:id="rId31"/>
     <p:sldId id="288" r:id="rId32"/>
+    <p:sldId id="289" r:id="rId33"/>
+    <p:sldId id="290" r:id="rId34"/>
   </p:sldIdLst>
   <p:sldSz cx="12192000" cy="6858000"/>
   <p:notesSz cx="6858000" cy="9144000"/>
@@ -10355,10 +10357,516 @@
           </a:p>
         </p:txBody>
       </p:sp>
+      <p:pic>
+        <p:nvPicPr>
+          <p:cNvPr id="5" name="Afbeelding 4"/>
+          <p:cNvPicPr>
+            <a:picLocks noChangeAspect="1"/>
+          </p:cNvPicPr>
+          <p:nvPr/>
+        </p:nvPicPr>
+        <p:blipFill>
+          <a:blip r:embed="rId3"/>
+          <a:stretch>
+            <a:fillRect/>
+          </a:stretch>
+        </p:blipFill>
+        <p:spPr>
+          <a:xfrm>
+            <a:off x="8698247" y="5749956"/>
+            <a:ext cx="1609725" cy="381000"/>
+          </a:xfrm>
+          <a:prstGeom prst="rect">
+            <a:avLst/>
+          </a:prstGeom>
+        </p:spPr>
+      </p:pic>
     </p:spTree>
     <p:extLst>
       <p:ext uri="{BB962C8B-B14F-4D97-AF65-F5344CB8AC3E}">
         <p14:creationId xmlns:p14="http://schemas.microsoft.com/office/powerpoint/2010/main" val="1683890557"/>
+      </p:ext>
+    </p:extLst>
+  </p:cSld>
+  <p:clrMapOvr>
+    <a:masterClrMapping/>
+  </p:clrMapOvr>
+</p:sld>
+</file>
+
+<file path=ppt/slides/slide32.xml><?xml version="1.0" encoding="utf-8"?>
+<p:sld xmlns:a="http://schemas.openxmlformats.org/drawingml/2006/main" xmlns:r="http://schemas.openxmlformats.org/officeDocument/2006/relationships" xmlns:p="http://schemas.openxmlformats.org/presentationml/2006/main">
+  <p:cSld>
+    <p:spTree>
+      <p:nvGrpSpPr>
+        <p:cNvPr id="1" name=""/>
+        <p:cNvGrpSpPr/>
+        <p:nvPr/>
+      </p:nvGrpSpPr>
+      <p:grpSpPr>
+        <a:xfrm>
+          <a:off x="0" y="0"/>
+          <a:ext cx="0" cy="0"/>
+          <a:chOff x="0" y="0"/>
+          <a:chExt cx="0" cy="0"/>
+        </a:xfrm>
+      </p:grpSpPr>
+      <p:sp>
+        <p:nvSpPr>
+          <p:cNvPr id="2" name="Tekstvak 1"/>
+          <p:cNvSpPr txBox="1"/>
+          <p:nvPr/>
+        </p:nvSpPr>
+        <p:spPr>
+          <a:xfrm>
+            <a:off x="612396" y="352338"/>
+            <a:ext cx="10989578" cy="923330"/>
+          </a:xfrm>
+          <a:prstGeom prst="rect">
+            <a:avLst/>
+          </a:prstGeom>
+          <a:noFill/>
+        </p:spPr>
+        <p:txBody>
+          <a:bodyPr wrap="square" rtlCol="0">
+            <a:spAutoFit/>
+          </a:bodyPr>
+          <a:lstStyle/>
+          <a:p>
+            <a:r>
+              <a:rPr lang="nl-BE" dirty="0">
+                <a:latin typeface="Roboto" panose="02000000000000000000" pitchFamily="2" charset="0"/>
+                <a:ea typeface="Roboto" panose="02000000000000000000" pitchFamily="2" charset="0"/>
+              </a:rPr>
+              <a:t>Er is ook communicatie mogelijk tussen 2 componenten die geen paren-</a:t>
+            </a:r>
+            <a:r>
+              <a:rPr lang="nl-BE" dirty="0" err="1">
+                <a:latin typeface="Roboto" panose="02000000000000000000" pitchFamily="2" charset="0"/>
+                <a:ea typeface="Roboto" panose="02000000000000000000" pitchFamily="2" charset="0"/>
+              </a:rPr>
+              <a:t>child</a:t>
+            </a:r>
+            <a:r>
+              <a:rPr lang="nl-BE" dirty="0">
+                <a:latin typeface="Roboto" panose="02000000000000000000" pitchFamily="2" charset="0"/>
+                <a:ea typeface="Roboto" panose="02000000000000000000" pitchFamily="2" charset="0"/>
+              </a:rPr>
+              <a:t> relatie hebben.</a:t>
+            </a:r>
+          </a:p>
+          <a:p>
+            <a:endParaRPr lang="nl-BE" dirty="0">
+              <a:latin typeface="Roboto" panose="02000000000000000000" pitchFamily="2" charset="0"/>
+              <a:ea typeface="Roboto" panose="02000000000000000000" pitchFamily="2" charset="0"/>
+            </a:endParaRPr>
+          </a:p>
+          <a:p>
+            <a:r>
+              <a:rPr lang="nl-BE" dirty="0">
+                <a:latin typeface="Roboto" panose="02000000000000000000" pitchFamily="2" charset="0"/>
+                <a:ea typeface="Roboto" panose="02000000000000000000" pitchFamily="2" charset="0"/>
+              </a:rPr>
+              <a:t>Hiervoor kan je een vue instantie maken die werkt als brug tussen de 2 componenten. </a:t>
+            </a:r>
+          </a:p>
+        </p:txBody>
+      </p:sp>
+      <p:pic>
+        <p:nvPicPr>
+          <p:cNvPr id="4" name="Afbeelding 3"/>
+          <p:cNvPicPr>
+            <a:picLocks noChangeAspect="1"/>
+          </p:cNvPicPr>
+          <p:nvPr/>
+        </p:nvPicPr>
+        <p:blipFill>
+          <a:blip r:embed="rId2"/>
+          <a:stretch>
+            <a:fillRect/>
+          </a:stretch>
+        </p:blipFill>
+        <p:spPr>
+          <a:xfrm>
+            <a:off x="612396" y="1656179"/>
+            <a:ext cx="1790700" cy="590550"/>
+          </a:xfrm>
+          <a:prstGeom prst="rect">
+            <a:avLst/>
+          </a:prstGeom>
+        </p:spPr>
+      </p:pic>
+      <p:sp>
+        <p:nvSpPr>
+          <p:cNvPr id="5" name="Tekstvak 4"/>
+          <p:cNvSpPr txBox="1"/>
+          <p:nvPr/>
+        </p:nvSpPr>
+        <p:spPr>
+          <a:xfrm>
+            <a:off x="612396" y="2627240"/>
+            <a:ext cx="10117123" cy="646331"/>
+          </a:xfrm>
+          <a:prstGeom prst="rect">
+            <a:avLst/>
+          </a:prstGeom>
+          <a:noFill/>
+        </p:spPr>
+        <p:txBody>
+          <a:bodyPr wrap="square" rtlCol="0">
+            <a:spAutoFit/>
+          </a:bodyPr>
+          <a:lstStyle/>
+          <a:p>
+            <a:r>
+              <a:rPr lang="nl-BE" dirty="0">
+                <a:latin typeface="Roboto" panose="02000000000000000000" pitchFamily="2" charset="0"/>
+                <a:ea typeface="Roboto" panose="02000000000000000000" pitchFamily="2" charset="0"/>
+              </a:rPr>
+              <a:t>Nu kunnen we vanuit 1 van de componenten een </a:t>
+            </a:r>
+            <a:r>
+              <a:rPr lang="nl-BE" dirty="0" err="1">
+                <a:latin typeface="Roboto" panose="02000000000000000000" pitchFamily="2" charset="0"/>
+                <a:ea typeface="Roboto" panose="02000000000000000000" pitchFamily="2" charset="0"/>
+              </a:rPr>
+              <a:t>emit</a:t>
+            </a:r>
+            <a:r>
+              <a:rPr lang="nl-BE" dirty="0">
+                <a:latin typeface="Roboto" panose="02000000000000000000" pitchFamily="2" charset="0"/>
+                <a:ea typeface="Roboto" panose="02000000000000000000" pitchFamily="2" charset="0"/>
+              </a:rPr>
+              <a:t> doen naar de brug</a:t>
+            </a:r>
+          </a:p>
+          <a:p>
+            <a:endParaRPr lang="nl-BE" dirty="0">
+              <a:latin typeface="Roboto" panose="02000000000000000000" pitchFamily="2" charset="0"/>
+              <a:ea typeface="Roboto" panose="02000000000000000000" pitchFamily="2" charset="0"/>
+            </a:endParaRPr>
+          </a:p>
+        </p:txBody>
+      </p:sp>
+      <p:pic>
+        <p:nvPicPr>
+          <p:cNvPr id="6" name="Afbeelding 5"/>
+          <p:cNvPicPr>
+            <a:picLocks noChangeAspect="1"/>
+          </p:cNvPicPr>
+          <p:nvPr/>
+        </p:nvPicPr>
+        <p:blipFill>
+          <a:blip r:embed="rId3"/>
+          <a:stretch>
+            <a:fillRect/>
+          </a:stretch>
+        </p:blipFill>
+        <p:spPr>
+          <a:xfrm>
+            <a:off x="612396" y="3430244"/>
+            <a:ext cx="3324225" cy="447675"/>
+          </a:xfrm>
+          <a:prstGeom prst="rect">
+            <a:avLst/>
+          </a:prstGeom>
+        </p:spPr>
+      </p:pic>
+      <p:sp>
+        <p:nvSpPr>
+          <p:cNvPr id="7" name="Tekstvak 6"/>
+          <p:cNvSpPr txBox="1"/>
+          <p:nvPr/>
+        </p:nvSpPr>
+        <p:spPr>
+          <a:xfrm>
+            <a:off x="679508" y="4420998"/>
+            <a:ext cx="10050011" cy="369332"/>
+          </a:xfrm>
+          <a:prstGeom prst="rect">
+            <a:avLst/>
+          </a:prstGeom>
+          <a:noFill/>
+        </p:spPr>
+        <p:txBody>
+          <a:bodyPr wrap="square" rtlCol="0">
+            <a:spAutoFit/>
+          </a:bodyPr>
+          <a:lstStyle/>
+          <a:p>
+            <a:r>
+              <a:rPr lang="nl-BE" dirty="0">
+                <a:latin typeface="Roboto" panose="02000000000000000000" pitchFamily="2" charset="0"/>
+                <a:ea typeface="Roboto" panose="02000000000000000000" pitchFamily="2" charset="0"/>
+              </a:rPr>
+              <a:t>Deze </a:t>
+            </a:r>
+            <a:r>
+              <a:rPr lang="nl-BE" dirty="0" err="1">
+                <a:latin typeface="Roboto" panose="02000000000000000000" pitchFamily="2" charset="0"/>
+                <a:ea typeface="Roboto" panose="02000000000000000000" pitchFamily="2" charset="0"/>
+              </a:rPr>
+              <a:t>emit</a:t>
+            </a:r>
+            <a:r>
+              <a:rPr lang="nl-BE" dirty="0">
+                <a:latin typeface="Roboto" panose="02000000000000000000" pitchFamily="2" charset="0"/>
+                <a:ea typeface="Roboto" panose="02000000000000000000" pitchFamily="2" charset="0"/>
+              </a:rPr>
+              <a:t> kunnen we opvangen in onze andere component in de </a:t>
+            </a:r>
+            <a:r>
+              <a:rPr lang="nl-BE" dirty="0" err="1">
+                <a:latin typeface="Roboto" panose="02000000000000000000" pitchFamily="2" charset="0"/>
+                <a:ea typeface="Roboto" panose="02000000000000000000" pitchFamily="2" charset="0"/>
+              </a:rPr>
+              <a:t>lifecycle</a:t>
+            </a:r>
+            <a:r>
+              <a:rPr lang="nl-BE" dirty="0">
+                <a:latin typeface="Roboto" panose="02000000000000000000" pitchFamily="2" charset="0"/>
+                <a:ea typeface="Roboto" panose="02000000000000000000" pitchFamily="2" charset="0"/>
+              </a:rPr>
+              <a:t> </a:t>
+            </a:r>
+            <a:r>
+              <a:rPr lang="nl-BE" dirty="0" err="1">
+                <a:latin typeface="Roboto" panose="02000000000000000000" pitchFamily="2" charset="0"/>
+                <a:ea typeface="Roboto" panose="02000000000000000000" pitchFamily="2" charset="0"/>
+              </a:rPr>
+              <a:t>hook</a:t>
+            </a:r>
+            <a:r>
+              <a:rPr lang="nl-BE" dirty="0">
+                <a:latin typeface="Roboto" panose="02000000000000000000" pitchFamily="2" charset="0"/>
+                <a:ea typeface="Roboto" panose="02000000000000000000" pitchFamily="2" charset="0"/>
+              </a:rPr>
+              <a:t> “</a:t>
+            </a:r>
+            <a:r>
+              <a:rPr lang="nl-BE" dirty="0" err="1">
+                <a:latin typeface="Roboto" panose="02000000000000000000" pitchFamily="2" charset="0"/>
+                <a:ea typeface="Roboto" panose="02000000000000000000" pitchFamily="2" charset="0"/>
+              </a:rPr>
+              <a:t>created</a:t>
+            </a:r>
+            <a:r>
+              <a:rPr lang="nl-BE" dirty="0">
+                <a:latin typeface="Roboto" panose="02000000000000000000" pitchFamily="2" charset="0"/>
+                <a:ea typeface="Roboto" panose="02000000000000000000" pitchFamily="2" charset="0"/>
+              </a:rPr>
+              <a:t>”</a:t>
+            </a:r>
+          </a:p>
+        </p:txBody>
+      </p:sp>
+      <p:pic>
+        <p:nvPicPr>
+          <p:cNvPr id="8" name="Afbeelding 7"/>
+          <p:cNvPicPr>
+            <a:picLocks noChangeAspect="1"/>
+          </p:cNvPicPr>
+          <p:nvPr/>
+        </p:nvPicPr>
+        <p:blipFill>
+          <a:blip r:embed="rId4"/>
+          <a:stretch>
+            <a:fillRect/>
+          </a:stretch>
+        </p:blipFill>
+        <p:spPr>
+          <a:xfrm>
+            <a:off x="612396" y="5025346"/>
+            <a:ext cx="4467225" cy="1590675"/>
+          </a:xfrm>
+          <a:prstGeom prst="rect">
+            <a:avLst/>
+          </a:prstGeom>
+        </p:spPr>
+      </p:pic>
+      <p:sp>
+        <p:nvSpPr>
+          <p:cNvPr id="9" name="Tekstvak 8"/>
+          <p:cNvSpPr txBox="1"/>
+          <p:nvPr/>
+        </p:nvSpPr>
+        <p:spPr>
+          <a:xfrm>
+            <a:off x="5670957" y="5100506"/>
+            <a:ext cx="4764948" cy="923330"/>
+          </a:xfrm>
+          <a:prstGeom prst="rect">
+            <a:avLst/>
+          </a:prstGeom>
+          <a:noFill/>
+        </p:spPr>
+        <p:txBody>
+          <a:bodyPr wrap="square" rtlCol="0">
+            <a:spAutoFit/>
+          </a:bodyPr>
+          <a:lstStyle/>
+          <a:p>
+            <a:r>
+              <a:rPr lang="nl-BE" dirty="0">
+                <a:latin typeface="Roboto" panose="02000000000000000000" pitchFamily="2" charset="0"/>
+                <a:ea typeface="Roboto" panose="02000000000000000000" pitchFamily="2" charset="0"/>
+              </a:rPr>
+              <a:t>Zo is er data </a:t>
+            </a:r>
+            <a:r>
+              <a:rPr lang="nl-BE" dirty="0" err="1">
+                <a:latin typeface="Roboto" panose="02000000000000000000" pitchFamily="2" charset="0"/>
+                <a:ea typeface="Roboto" panose="02000000000000000000" pitchFamily="2" charset="0"/>
+              </a:rPr>
+              <a:t>gecommuniceert</a:t>
+            </a:r>
+            <a:r>
+              <a:rPr lang="nl-BE" dirty="0">
+                <a:latin typeface="Roboto" panose="02000000000000000000" pitchFamily="2" charset="0"/>
+                <a:ea typeface="Roboto" panose="02000000000000000000" pitchFamily="2" charset="0"/>
+              </a:rPr>
+              <a:t> tussen 2 componenten die geen </a:t>
+            </a:r>
+            <a:r>
+              <a:rPr lang="nl-BE" dirty="0" err="1">
+                <a:latin typeface="Roboto" panose="02000000000000000000" pitchFamily="2" charset="0"/>
+                <a:ea typeface="Roboto" panose="02000000000000000000" pitchFamily="2" charset="0"/>
+              </a:rPr>
+              <a:t>parent-child</a:t>
+            </a:r>
+            <a:r>
+              <a:rPr lang="nl-BE" dirty="0">
+                <a:latin typeface="Roboto" panose="02000000000000000000" pitchFamily="2" charset="0"/>
+                <a:ea typeface="Roboto" panose="02000000000000000000" pitchFamily="2" charset="0"/>
+              </a:rPr>
+              <a:t> relatie hebben.</a:t>
+            </a:r>
+          </a:p>
+        </p:txBody>
+      </p:sp>
+    </p:spTree>
+    <p:extLst>
+      <p:ext uri="{BB962C8B-B14F-4D97-AF65-F5344CB8AC3E}">
+        <p14:creationId xmlns:p14="http://schemas.microsoft.com/office/powerpoint/2010/main" val="3478918778"/>
+      </p:ext>
+    </p:extLst>
+  </p:cSld>
+  <p:clrMapOvr>
+    <a:masterClrMapping/>
+  </p:clrMapOvr>
+</p:sld>
+</file>
+
+<file path=ppt/slides/slide33.xml><?xml version="1.0" encoding="utf-8"?>
+<p:sld xmlns:a="http://schemas.openxmlformats.org/drawingml/2006/main" xmlns:r="http://schemas.openxmlformats.org/officeDocument/2006/relationships" xmlns:p="http://schemas.openxmlformats.org/presentationml/2006/main">
+  <p:cSld>
+    <p:spTree>
+      <p:nvGrpSpPr>
+        <p:cNvPr id="1" name=""/>
+        <p:cNvGrpSpPr/>
+        <p:nvPr/>
+      </p:nvGrpSpPr>
+      <p:grpSpPr>
+        <a:xfrm>
+          <a:off x="0" y="0"/>
+          <a:ext cx="0" cy="0"/>
+          <a:chOff x="0" y="0"/>
+          <a:chExt cx="0" cy="0"/>
+        </a:xfrm>
+      </p:grpSpPr>
+      <p:sp>
+        <p:nvSpPr>
+          <p:cNvPr id="2" name="Tekstvak 1"/>
+          <p:cNvSpPr txBox="1"/>
+          <p:nvPr/>
+        </p:nvSpPr>
+        <p:spPr>
+          <a:xfrm>
+            <a:off x="738231" y="385894"/>
+            <a:ext cx="10687575" cy="1200329"/>
+          </a:xfrm>
+          <a:prstGeom prst="rect">
+            <a:avLst/>
+          </a:prstGeom>
+          <a:noFill/>
+        </p:spPr>
+        <p:txBody>
+          <a:bodyPr wrap="square" rtlCol="0">
+            <a:spAutoFit/>
+          </a:bodyPr>
+          <a:lstStyle/>
+          <a:p>
+            <a:r>
+              <a:rPr lang="nl-BE" dirty="0">
+                <a:latin typeface="Roboto" panose="02000000000000000000" pitchFamily="2" charset="0"/>
+                <a:ea typeface="Roboto" panose="02000000000000000000" pitchFamily="2" charset="0"/>
+              </a:rPr>
+              <a:t>Zo, deze slideshow bevat de basis van vue.js</a:t>
+            </a:r>
+          </a:p>
+          <a:p>
+            <a:endParaRPr lang="nl-BE" dirty="0">
+              <a:latin typeface="Roboto" panose="02000000000000000000" pitchFamily="2" charset="0"/>
+              <a:ea typeface="Roboto" panose="02000000000000000000" pitchFamily="2" charset="0"/>
+            </a:endParaRPr>
+          </a:p>
+          <a:p>
+            <a:r>
+              <a:rPr lang="nl-BE" dirty="0">
+                <a:latin typeface="Roboto" panose="02000000000000000000" pitchFamily="2" charset="0"/>
+                <a:ea typeface="Roboto" panose="02000000000000000000" pitchFamily="2" charset="0"/>
+              </a:rPr>
+              <a:t>Als je nog meer wil weten aarzel dan niet om de vue.js </a:t>
+            </a:r>
+            <a:r>
+              <a:rPr lang="nl-BE" dirty="0" err="1">
+                <a:latin typeface="Roboto" panose="02000000000000000000" pitchFamily="2" charset="0"/>
+                <a:ea typeface="Roboto" panose="02000000000000000000" pitchFamily="2" charset="0"/>
+              </a:rPr>
+              <a:t>api</a:t>
+            </a:r>
+            <a:r>
+              <a:rPr lang="nl-BE" dirty="0">
+                <a:latin typeface="Roboto" panose="02000000000000000000" pitchFamily="2" charset="0"/>
+                <a:ea typeface="Roboto" panose="02000000000000000000" pitchFamily="2" charset="0"/>
+              </a:rPr>
+              <a:t> er bij te halen. Hier staan al de mogelijk </a:t>
+            </a:r>
+            <a:r>
+              <a:rPr lang="nl-BE" dirty="0" err="1">
+                <a:latin typeface="Roboto" panose="02000000000000000000" pitchFamily="2" charset="0"/>
+                <a:ea typeface="Roboto" panose="02000000000000000000" pitchFamily="2" charset="0"/>
+              </a:rPr>
+              <a:t>directives</a:t>
+            </a:r>
+            <a:r>
+              <a:rPr lang="nl-BE" dirty="0">
+                <a:latin typeface="Roboto" panose="02000000000000000000" pitchFamily="2" charset="0"/>
+                <a:ea typeface="Roboto" panose="02000000000000000000" pitchFamily="2" charset="0"/>
+              </a:rPr>
+              <a:t>,  methodes, </a:t>
+            </a:r>
+            <a:r>
+              <a:rPr lang="nl-BE" dirty="0" err="1">
+                <a:latin typeface="Roboto" panose="02000000000000000000" pitchFamily="2" charset="0"/>
+                <a:ea typeface="Roboto" panose="02000000000000000000" pitchFamily="2" charset="0"/>
+              </a:rPr>
+              <a:t>properties</a:t>
+            </a:r>
+            <a:r>
+              <a:rPr lang="nl-BE" dirty="0">
+                <a:latin typeface="Roboto" panose="02000000000000000000" pitchFamily="2" charset="0"/>
+                <a:ea typeface="Roboto" panose="02000000000000000000" pitchFamily="2" charset="0"/>
+              </a:rPr>
+              <a:t>, noem maar op.</a:t>
+            </a:r>
+          </a:p>
+        </p:txBody>
+      </p:sp>
+    </p:spTree>
+    <p:extLst>
+      <p:ext uri="{BB962C8B-B14F-4D97-AF65-F5344CB8AC3E}">
+        <p14:creationId xmlns:p14="http://schemas.microsoft.com/office/powerpoint/2010/main" val="2809645046"/>
       </p:ext>
     </p:extLst>
   </p:cSld>

</xml_diff>

<commit_message>
laravel + vue toegevoegd
</commit_message>
<xml_diff>
--- a/newTech/slideshow.pptx
+++ b/newTech/slideshow.pptx
@@ -5,7 +5,7 @@
     <p:sldMasterId id="2147483678" r:id="rId1"/>
   </p:sldMasterIdLst>
   <p:notesMasterIdLst>
-    <p:notesMasterId r:id="rId35"/>
+    <p:notesMasterId r:id="rId40"/>
   </p:notesMasterIdLst>
   <p:sldIdLst>
     <p:sldId id="256" r:id="rId2"/>
@@ -40,7 +40,12 @@
     <p:sldId id="286" r:id="rId31"/>
     <p:sldId id="288" r:id="rId32"/>
     <p:sldId id="289" r:id="rId33"/>
-    <p:sldId id="290" r:id="rId34"/>
+    <p:sldId id="291" r:id="rId34"/>
+    <p:sldId id="292" r:id="rId35"/>
+    <p:sldId id="293" r:id="rId36"/>
+    <p:sldId id="294" r:id="rId37"/>
+    <p:sldId id="295" r:id="rId38"/>
+    <p:sldId id="290" r:id="rId39"/>
   </p:sldIdLst>
   <p:sldSz cx="12192000" cy="6858000"/>
   <p:notesSz cx="6858000" cy="9144000"/>
@@ -10758,6 +10763,1558 @@
 </file>
 
 <file path=ppt/slides/slide33.xml><?xml version="1.0" encoding="utf-8"?>
+<p:sld xmlns:a="http://schemas.openxmlformats.org/drawingml/2006/main" xmlns:r="http://schemas.openxmlformats.org/officeDocument/2006/relationships" xmlns:p="http://schemas.openxmlformats.org/presentationml/2006/main">
+  <p:cSld>
+    <p:spTree>
+      <p:nvGrpSpPr>
+        <p:cNvPr id="1" name=""/>
+        <p:cNvGrpSpPr/>
+        <p:nvPr/>
+      </p:nvGrpSpPr>
+      <p:grpSpPr>
+        <a:xfrm>
+          <a:off x="0" y="0"/>
+          <a:ext cx="0" cy="0"/>
+          <a:chOff x="0" y="0"/>
+          <a:chExt cx="0" cy="0"/>
+        </a:xfrm>
+      </p:grpSpPr>
+      <p:sp>
+        <p:nvSpPr>
+          <p:cNvPr id="2" name="Tekstvak 1"/>
+          <p:cNvSpPr txBox="1"/>
+          <p:nvPr/>
+        </p:nvSpPr>
+        <p:spPr>
+          <a:xfrm>
+            <a:off x="612396" y="293615"/>
+            <a:ext cx="10855354" cy="923330"/>
+          </a:xfrm>
+          <a:prstGeom prst="rect">
+            <a:avLst/>
+          </a:prstGeom>
+          <a:noFill/>
+        </p:spPr>
+        <p:txBody>
+          <a:bodyPr wrap="square" rtlCol="0">
+            <a:spAutoFit/>
+          </a:bodyPr>
+          <a:lstStyle/>
+          <a:p>
+            <a:pPr algn="ctr"/>
+            <a:r>
+              <a:rPr lang="nl-BE" sz="5400" dirty="0">
+                <a:latin typeface="Haettenschweiler" panose="020B0706040902060204" pitchFamily="34" charset="0"/>
+              </a:rPr>
+              <a:t>Ajax en </a:t>
+            </a:r>
+            <a:r>
+              <a:rPr lang="nl-BE" sz="5400" dirty="0" err="1">
+                <a:latin typeface="Haettenschweiler" panose="020B0706040902060204" pitchFamily="34" charset="0"/>
+              </a:rPr>
+              <a:t>laravel</a:t>
+            </a:r>
+            <a:endParaRPr lang="nl-BE" sz="5400" dirty="0">
+              <a:latin typeface="Haettenschweiler" panose="020B0706040902060204" pitchFamily="34" charset="0"/>
+            </a:endParaRPr>
+          </a:p>
+        </p:txBody>
+      </p:sp>
+      <p:sp>
+        <p:nvSpPr>
+          <p:cNvPr id="3" name="Tekstvak 2"/>
+          <p:cNvSpPr txBox="1"/>
+          <p:nvPr/>
+        </p:nvSpPr>
+        <p:spPr>
+          <a:xfrm>
+            <a:off x="755009" y="1434517"/>
+            <a:ext cx="10628852" cy="369332"/>
+          </a:xfrm>
+          <a:prstGeom prst="rect">
+            <a:avLst/>
+          </a:prstGeom>
+          <a:noFill/>
+        </p:spPr>
+        <p:txBody>
+          <a:bodyPr wrap="square" rtlCol="0">
+            <a:spAutoFit/>
+          </a:bodyPr>
+          <a:lstStyle/>
+          <a:p>
+            <a:r>
+              <a:rPr lang="nl-BE" dirty="0">
+                <a:latin typeface="Roboto" panose="02000000000000000000" pitchFamily="2" charset="0"/>
+                <a:ea typeface="Roboto" panose="02000000000000000000" pitchFamily="2" charset="0"/>
+              </a:rPr>
+              <a:t>In dit voorbeeld ga ik een </a:t>
+            </a:r>
+            <a:r>
+              <a:rPr lang="nl-BE" dirty="0" err="1">
+                <a:latin typeface="Roboto" panose="02000000000000000000" pitchFamily="2" charset="0"/>
+                <a:ea typeface="Roboto" panose="02000000000000000000" pitchFamily="2" charset="0"/>
+              </a:rPr>
+              <a:t>eenvouwdige</a:t>
+            </a:r>
+            <a:r>
+              <a:rPr lang="nl-BE" dirty="0">
+                <a:latin typeface="Roboto" panose="02000000000000000000" pitchFamily="2" charset="0"/>
+                <a:ea typeface="Roboto" panose="02000000000000000000" pitchFamily="2" charset="0"/>
+              </a:rPr>
+              <a:t> </a:t>
+            </a:r>
+            <a:r>
+              <a:rPr lang="nl-BE" dirty="0" err="1">
+                <a:latin typeface="Roboto" panose="02000000000000000000" pitchFamily="2" charset="0"/>
+                <a:ea typeface="Roboto" panose="02000000000000000000" pitchFamily="2" charset="0"/>
+              </a:rPr>
+              <a:t>laravel</a:t>
+            </a:r>
+            <a:r>
+              <a:rPr lang="nl-BE" dirty="0">
+                <a:latin typeface="Roboto" panose="02000000000000000000" pitchFamily="2" charset="0"/>
+                <a:ea typeface="Roboto" panose="02000000000000000000" pitchFamily="2" charset="0"/>
+              </a:rPr>
+              <a:t> applicatie maken om kaarten te bekijken en bewerken.</a:t>
+            </a:r>
+          </a:p>
+        </p:txBody>
+      </p:sp>
+      <p:sp>
+        <p:nvSpPr>
+          <p:cNvPr id="4" name="Tekstvak 3"/>
+          <p:cNvSpPr txBox="1"/>
+          <p:nvPr/>
+        </p:nvSpPr>
+        <p:spPr>
+          <a:xfrm>
+            <a:off x="755009" y="2114026"/>
+            <a:ext cx="10310070" cy="1754326"/>
+          </a:xfrm>
+          <a:prstGeom prst="rect">
+            <a:avLst/>
+          </a:prstGeom>
+          <a:noFill/>
+        </p:spPr>
+        <p:txBody>
+          <a:bodyPr wrap="square" rtlCol="0">
+            <a:spAutoFit/>
+          </a:bodyPr>
+          <a:lstStyle/>
+          <a:p>
+            <a:r>
+              <a:rPr lang="nl-BE" dirty="0">
+                <a:latin typeface="Roboto" panose="02000000000000000000" pitchFamily="2" charset="0"/>
+                <a:ea typeface="Roboto" panose="02000000000000000000" pitchFamily="2" charset="0"/>
+              </a:rPr>
+              <a:t>Ik heb eerst een databank aangemaakt met een “cards” </a:t>
+            </a:r>
+            <a:r>
+              <a:rPr lang="nl-BE" dirty="0" err="1">
+                <a:latin typeface="Roboto" panose="02000000000000000000" pitchFamily="2" charset="0"/>
+                <a:ea typeface="Roboto" panose="02000000000000000000" pitchFamily="2" charset="0"/>
+              </a:rPr>
+              <a:t>table</a:t>
+            </a:r>
+            <a:r>
+              <a:rPr lang="nl-BE" dirty="0">
+                <a:latin typeface="Roboto" panose="02000000000000000000" pitchFamily="2" charset="0"/>
+                <a:ea typeface="Roboto" panose="02000000000000000000" pitchFamily="2" charset="0"/>
+              </a:rPr>
+              <a:t> die een “titel” en “body” </a:t>
+            </a:r>
+            <a:r>
+              <a:rPr lang="nl-BE" dirty="0" err="1">
+                <a:latin typeface="Roboto" panose="02000000000000000000" pitchFamily="2" charset="0"/>
+                <a:ea typeface="Roboto" panose="02000000000000000000" pitchFamily="2" charset="0"/>
+              </a:rPr>
+              <a:t>row</a:t>
+            </a:r>
+            <a:r>
+              <a:rPr lang="nl-BE" dirty="0">
+                <a:latin typeface="Roboto" panose="02000000000000000000" pitchFamily="2" charset="0"/>
+                <a:ea typeface="Roboto" panose="02000000000000000000" pitchFamily="2" charset="0"/>
+              </a:rPr>
+              <a:t> heeft.</a:t>
+            </a:r>
+          </a:p>
+          <a:p>
+            <a:r>
+              <a:rPr lang="nl-BE" dirty="0">
+                <a:latin typeface="Roboto" panose="02000000000000000000" pitchFamily="2" charset="0"/>
+                <a:ea typeface="Roboto" panose="02000000000000000000" pitchFamily="2" charset="0"/>
+              </a:rPr>
+              <a:t>Dan heb ik de 3 </a:t>
+            </a:r>
+            <a:r>
+              <a:rPr lang="nl-BE" dirty="0" err="1">
+                <a:latin typeface="Roboto" panose="02000000000000000000" pitchFamily="2" charset="0"/>
+                <a:ea typeface="Roboto" panose="02000000000000000000" pitchFamily="2" charset="0"/>
+              </a:rPr>
+              <a:t>api’s</a:t>
+            </a:r>
+            <a:r>
+              <a:rPr lang="nl-BE" dirty="0">
+                <a:latin typeface="Roboto" panose="02000000000000000000" pitchFamily="2" charset="0"/>
+                <a:ea typeface="Roboto" panose="02000000000000000000" pitchFamily="2" charset="0"/>
+              </a:rPr>
+              <a:t> aangemaakt:</a:t>
+            </a:r>
+          </a:p>
+          <a:p>
+            <a:endParaRPr lang="nl-BE" dirty="0">
+              <a:latin typeface="Roboto" panose="02000000000000000000" pitchFamily="2" charset="0"/>
+              <a:ea typeface="Roboto" panose="02000000000000000000" pitchFamily="2" charset="0"/>
+            </a:endParaRPr>
+          </a:p>
+          <a:p>
+            <a:pPr marL="342900" indent="-342900">
+              <a:buFont typeface="+mj-lt"/>
+              <a:buAutoNum type="arabicPeriod"/>
+            </a:pPr>
+            <a:r>
+              <a:rPr lang="nl-BE" dirty="0">
+                <a:latin typeface="Roboto" panose="02000000000000000000" pitchFamily="2" charset="0"/>
+                <a:ea typeface="Roboto" panose="02000000000000000000" pitchFamily="2" charset="0"/>
+              </a:rPr>
+              <a:t>Alle kaarten terug geven - get</a:t>
+            </a:r>
+          </a:p>
+          <a:p>
+            <a:pPr marL="342900" indent="-342900">
+              <a:buFont typeface="+mj-lt"/>
+              <a:buAutoNum type="arabicPeriod"/>
+            </a:pPr>
+            <a:r>
+              <a:rPr lang="nl-BE" dirty="0">
+                <a:latin typeface="Roboto" panose="02000000000000000000" pitchFamily="2" charset="0"/>
+                <a:ea typeface="Roboto" panose="02000000000000000000" pitchFamily="2" charset="0"/>
+              </a:rPr>
+              <a:t>1 specifieke kaart terug geven - get</a:t>
+            </a:r>
+          </a:p>
+          <a:p>
+            <a:pPr marL="342900" indent="-342900">
+              <a:buFont typeface="+mj-lt"/>
+              <a:buAutoNum type="arabicPeriod"/>
+            </a:pPr>
+            <a:r>
+              <a:rPr lang="nl-BE" dirty="0">
+                <a:latin typeface="Roboto" panose="02000000000000000000" pitchFamily="2" charset="0"/>
+                <a:ea typeface="Roboto" panose="02000000000000000000" pitchFamily="2" charset="0"/>
+              </a:rPr>
+              <a:t>Een bepaalde kaart bewerken - post</a:t>
+            </a:r>
+          </a:p>
+        </p:txBody>
+      </p:sp>
+      <p:pic>
+        <p:nvPicPr>
+          <p:cNvPr id="5" name="Afbeelding 4"/>
+          <p:cNvPicPr>
+            <a:picLocks noChangeAspect="1"/>
+          </p:cNvPicPr>
+          <p:nvPr/>
+        </p:nvPicPr>
+        <p:blipFill>
+          <a:blip r:embed="rId2"/>
+          <a:stretch>
+            <a:fillRect/>
+          </a:stretch>
+        </p:blipFill>
+        <p:spPr>
+          <a:xfrm>
+            <a:off x="6502604" y="2991189"/>
+            <a:ext cx="4562475" cy="3571875"/>
+          </a:xfrm>
+          <a:prstGeom prst="rect">
+            <a:avLst/>
+          </a:prstGeom>
+        </p:spPr>
+      </p:pic>
+      <p:sp>
+        <p:nvSpPr>
+          <p:cNvPr id="6" name="Tekstvak 5"/>
+          <p:cNvSpPr txBox="1"/>
+          <p:nvPr/>
+        </p:nvSpPr>
+        <p:spPr>
+          <a:xfrm>
+            <a:off x="755009" y="4229675"/>
+            <a:ext cx="4890782" cy="646331"/>
+          </a:xfrm>
+          <a:prstGeom prst="rect">
+            <a:avLst/>
+          </a:prstGeom>
+          <a:noFill/>
+        </p:spPr>
+        <p:txBody>
+          <a:bodyPr wrap="square" rtlCol="0">
+            <a:spAutoFit/>
+          </a:bodyPr>
+          <a:lstStyle/>
+          <a:p>
+            <a:r>
+              <a:rPr lang="nl-BE" dirty="0">
+                <a:latin typeface="Roboto" panose="02000000000000000000" pitchFamily="2" charset="0"/>
+                <a:ea typeface="Roboto" panose="02000000000000000000" pitchFamily="2" charset="0"/>
+              </a:rPr>
+              <a:t>Deze 3 </a:t>
+            </a:r>
+            <a:r>
+              <a:rPr lang="nl-BE" dirty="0" err="1">
+                <a:latin typeface="Roboto" panose="02000000000000000000" pitchFamily="2" charset="0"/>
+                <a:ea typeface="Roboto" panose="02000000000000000000" pitchFamily="2" charset="0"/>
+              </a:rPr>
+              <a:t>api’s</a:t>
+            </a:r>
+            <a:r>
+              <a:rPr lang="nl-BE" dirty="0">
+                <a:latin typeface="Roboto" panose="02000000000000000000" pitchFamily="2" charset="0"/>
+                <a:ea typeface="Roboto" panose="02000000000000000000" pitchFamily="2" charset="0"/>
+              </a:rPr>
+              <a:t> ga ik gebruiken om de nodige dingen op te vragen of te bewerken met vue.</a:t>
+            </a:r>
+          </a:p>
+        </p:txBody>
+      </p:sp>
+    </p:spTree>
+    <p:extLst>
+      <p:ext uri="{BB962C8B-B14F-4D97-AF65-F5344CB8AC3E}">
+        <p14:creationId xmlns:p14="http://schemas.microsoft.com/office/powerpoint/2010/main" val="3999937166"/>
+      </p:ext>
+    </p:extLst>
+  </p:cSld>
+  <p:clrMapOvr>
+    <a:masterClrMapping/>
+  </p:clrMapOvr>
+</p:sld>
+</file>
+
+<file path=ppt/slides/slide34.xml><?xml version="1.0" encoding="utf-8"?>
+<p:sld xmlns:a="http://schemas.openxmlformats.org/drawingml/2006/main" xmlns:r="http://schemas.openxmlformats.org/officeDocument/2006/relationships" xmlns:p="http://schemas.openxmlformats.org/presentationml/2006/main">
+  <p:cSld>
+    <p:spTree>
+      <p:nvGrpSpPr>
+        <p:cNvPr id="1" name=""/>
+        <p:cNvGrpSpPr/>
+        <p:nvPr/>
+      </p:nvGrpSpPr>
+      <p:grpSpPr>
+        <a:xfrm>
+          <a:off x="0" y="0"/>
+          <a:ext cx="0" cy="0"/>
+          <a:chOff x="0" y="0"/>
+          <a:chExt cx="0" cy="0"/>
+        </a:xfrm>
+      </p:grpSpPr>
+      <p:sp>
+        <p:nvSpPr>
+          <p:cNvPr id="2" name="Tekstvak 1"/>
+          <p:cNvSpPr txBox="1"/>
+          <p:nvPr/>
+        </p:nvSpPr>
+        <p:spPr>
+          <a:xfrm>
+            <a:off x="637563" y="436228"/>
+            <a:ext cx="10830187" cy="923330"/>
+          </a:xfrm>
+          <a:prstGeom prst="rect">
+            <a:avLst/>
+          </a:prstGeom>
+          <a:noFill/>
+        </p:spPr>
+        <p:txBody>
+          <a:bodyPr wrap="square" rtlCol="0">
+            <a:spAutoFit/>
+          </a:bodyPr>
+          <a:lstStyle/>
+          <a:p>
+            <a:r>
+              <a:rPr lang="nl-BE" dirty="0">
+                <a:latin typeface="Roboto" panose="02000000000000000000" pitchFamily="2" charset="0"/>
+                <a:ea typeface="Roboto" panose="02000000000000000000" pitchFamily="2" charset="0"/>
+              </a:rPr>
+              <a:t>Nu al de </a:t>
+            </a:r>
+            <a:r>
+              <a:rPr lang="nl-BE" dirty="0" err="1">
+                <a:latin typeface="Roboto" panose="02000000000000000000" pitchFamily="2" charset="0"/>
+                <a:ea typeface="Roboto" panose="02000000000000000000" pitchFamily="2" charset="0"/>
+              </a:rPr>
+              <a:t>back-end</a:t>
+            </a:r>
+            <a:r>
+              <a:rPr lang="nl-BE" dirty="0">
+                <a:latin typeface="Roboto" panose="02000000000000000000" pitchFamily="2" charset="0"/>
+                <a:ea typeface="Roboto" panose="02000000000000000000" pitchFamily="2" charset="0"/>
+              </a:rPr>
+              <a:t> achter de rug is kunnen </a:t>
+            </a:r>
+            <a:r>
+              <a:rPr lang="nl-BE" dirty="0" err="1">
+                <a:latin typeface="Roboto" panose="02000000000000000000" pitchFamily="2" charset="0"/>
+                <a:ea typeface="Roboto" panose="02000000000000000000" pitchFamily="2" charset="0"/>
+              </a:rPr>
+              <a:t>wa</a:t>
+            </a:r>
+            <a:r>
+              <a:rPr lang="nl-BE" dirty="0">
+                <a:latin typeface="Roboto" panose="02000000000000000000" pitchFamily="2" charset="0"/>
+                <a:ea typeface="Roboto" panose="02000000000000000000" pitchFamily="2" charset="0"/>
+              </a:rPr>
+              <a:t> aan de front-end beginnen.</a:t>
+            </a:r>
+          </a:p>
+          <a:p>
+            <a:endParaRPr lang="nl-BE" dirty="0">
+              <a:latin typeface="Roboto" panose="02000000000000000000" pitchFamily="2" charset="0"/>
+              <a:ea typeface="Roboto" panose="02000000000000000000" pitchFamily="2" charset="0"/>
+            </a:endParaRPr>
+          </a:p>
+          <a:p>
+            <a:r>
+              <a:rPr lang="nl-BE" dirty="0">
+                <a:latin typeface="Roboto" panose="02000000000000000000" pitchFamily="2" charset="0"/>
+                <a:ea typeface="Roboto" panose="02000000000000000000" pitchFamily="2" charset="0"/>
+              </a:rPr>
+              <a:t>Ik ga werken met een component “</a:t>
+            </a:r>
+            <a:r>
+              <a:rPr lang="nl-BE" b="1" dirty="0">
+                <a:latin typeface="Roboto" panose="02000000000000000000" pitchFamily="2" charset="0"/>
+                <a:ea typeface="Roboto" panose="02000000000000000000" pitchFamily="2" charset="0"/>
+              </a:rPr>
+              <a:t>cards</a:t>
+            </a:r>
+            <a:r>
+              <a:rPr lang="nl-BE" dirty="0">
+                <a:latin typeface="Roboto" panose="02000000000000000000" pitchFamily="2" charset="0"/>
+                <a:ea typeface="Roboto" panose="02000000000000000000" pitchFamily="2" charset="0"/>
+              </a:rPr>
+              <a:t>”</a:t>
+            </a:r>
+          </a:p>
+        </p:txBody>
+      </p:sp>
+      <p:pic>
+        <p:nvPicPr>
+          <p:cNvPr id="4" name="Afbeelding 3"/>
+          <p:cNvPicPr>
+            <a:picLocks noChangeAspect="1"/>
+          </p:cNvPicPr>
+          <p:nvPr/>
+        </p:nvPicPr>
+        <p:blipFill>
+          <a:blip r:embed="rId2"/>
+          <a:stretch>
+            <a:fillRect/>
+          </a:stretch>
+        </p:blipFill>
+        <p:spPr>
+          <a:xfrm>
+            <a:off x="758635" y="1804944"/>
+            <a:ext cx="3057525" cy="1771650"/>
+          </a:xfrm>
+          <a:prstGeom prst="rect">
+            <a:avLst/>
+          </a:prstGeom>
+        </p:spPr>
+      </p:pic>
+      <p:sp>
+        <p:nvSpPr>
+          <p:cNvPr id="5" name="Tekstvak 4"/>
+          <p:cNvSpPr txBox="1"/>
+          <p:nvPr/>
+        </p:nvSpPr>
+        <p:spPr>
+          <a:xfrm>
+            <a:off x="4756558" y="1804944"/>
+            <a:ext cx="6040073" cy="1200329"/>
+          </a:xfrm>
+          <a:prstGeom prst="rect">
+            <a:avLst/>
+          </a:prstGeom>
+          <a:noFill/>
+        </p:spPr>
+        <p:txBody>
+          <a:bodyPr wrap="square" rtlCol="0">
+            <a:spAutoFit/>
+          </a:bodyPr>
+          <a:lstStyle/>
+          <a:p>
+            <a:r>
+              <a:rPr lang="nl-BE" dirty="0">
+                <a:latin typeface="Roboto" panose="02000000000000000000" pitchFamily="2" charset="0"/>
+                <a:ea typeface="Roboto" panose="02000000000000000000" pitchFamily="2" charset="0"/>
+              </a:rPr>
+              <a:t>De template heb ik gelinkt naar de html pagina waar ik de inhoud in een div heb gestoken met het </a:t>
+            </a:r>
+            <a:r>
+              <a:rPr lang="nl-BE" dirty="0" err="1">
+                <a:latin typeface="Roboto" panose="02000000000000000000" pitchFamily="2" charset="0"/>
+                <a:ea typeface="Roboto" panose="02000000000000000000" pitchFamily="2" charset="0"/>
+              </a:rPr>
+              <a:t>id</a:t>
+            </a:r>
+            <a:r>
+              <a:rPr lang="nl-BE" dirty="0">
+                <a:latin typeface="Roboto" panose="02000000000000000000" pitchFamily="2" charset="0"/>
+                <a:ea typeface="Roboto" panose="02000000000000000000" pitchFamily="2" charset="0"/>
+              </a:rPr>
+              <a:t>: </a:t>
+            </a:r>
+            <a:r>
+              <a:rPr lang="nl-BE" dirty="0" err="1">
+                <a:latin typeface="Roboto" panose="02000000000000000000" pitchFamily="2" charset="0"/>
+                <a:ea typeface="Roboto" panose="02000000000000000000" pitchFamily="2" charset="0"/>
+              </a:rPr>
+              <a:t>cardTemplate</a:t>
+            </a:r>
+            <a:r>
+              <a:rPr lang="nl-BE" dirty="0">
+                <a:latin typeface="Roboto" panose="02000000000000000000" pitchFamily="2" charset="0"/>
+                <a:ea typeface="Roboto" panose="02000000000000000000" pitchFamily="2" charset="0"/>
+              </a:rPr>
+              <a:t>.</a:t>
+            </a:r>
+          </a:p>
+          <a:p>
+            <a:r>
+              <a:rPr lang="nl-BE" dirty="0">
+                <a:latin typeface="Roboto" panose="02000000000000000000" pitchFamily="2" charset="0"/>
+                <a:ea typeface="Roboto" panose="02000000000000000000" pitchFamily="2" charset="0"/>
+              </a:rPr>
+              <a:t>Dit houd de html en javascript wat beter </a:t>
+            </a:r>
+            <a:r>
+              <a:rPr lang="nl-BE" dirty="0" err="1">
+                <a:latin typeface="Roboto" panose="02000000000000000000" pitchFamily="2" charset="0"/>
+                <a:ea typeface="Roboto" panose="02000000000000000000" pitchFamily="2" charset="0"/>
+              </a:rPr>
+              <a:t>gescheide</a:t>
+            </a:r>
+            <a:r>
+              <a:rPr lang="nl-BE" dirty="0">
+                <a:latin typeface="Roboto" panose="02000000000000000000" pitchFamily="2" charset="0"/>
+                <a:ea typeface="Roboto" panose="02000000000000000000" pitchFamily="2" charset="0"/>
+              </a:rPr>
+              <a:t>.</a:t>
+            </a:r>
+          </a:p>
+        </p:txBody>
+      </p:sp>
+      <p:sp>
+        <p:nvSpPr>
+          <p:cNvPr id="6" name="Tekstvak 5"/>
+          <p:cNvSpPr txBox="1"/>
+          <p:nvPr/>
+        </p:nvSpPr>
+        <p:spPr>
+          <a:xfrm>
+            <a:off x="758635" y="4043494"/>
+            <a:ext cx="10331611" cy="2031325"/>
+          </a:xfrm>
+          <a:prstGeom prst="rect">
+            <a:avLst/>
+          </a:prstGeom>
+          <a:noFill/>
+        </p:spPr>
+        <p:txBody>
+          <a:bodyPr wrap="square" rtlCol="0">
+            <a:spAutoFit/>
+          </a:bodyPr>
+          <a:lstStyle/>
+          <a:p>
+            <a:r>
+              <a:rPr lang="nl-BE" dirty="0">
+                <a:latin typeface="Roboto" panose="02000000000000000000" pitchFamily="2" charset="0"/>
+                <a:ea typeface="Roboto" panose="02000000000000000000" pitchFamily="2" charset="0"/>
+              </a:rPr>
+              <a:t>De card component bevat 5 data variabelen</a:t>
+            </a:r>
+          </a:p>
+          <a:p>
+            <a:endParaRPr lang="nl-BE" dirty="0">
+              <a:latin typeface="Roboto" panose="02000000000000000000" pitchFamily="2" charset="0"/>
+              <a:ea typeface="Roboto" panose="02000000000000000000" pitchFamily="2" charset="0"/>
+            </a:endParaRPr>
+          </a:p>
+          <a:p>
+            <a:pPr marL="285750" indent="-285750">
+              <a:buFont typeface="Arial" panose="020B0604020202020204" pitchFamily="34" charset="0"/>
+              <a:buChar char="•"/>
+            </a:pPr>
+            <a:r>
+              <a:rPr lang="nl-BE" dirty="0">
+                <a:latin typeface="Roboto" panose="02000000000000000000" pitchFamily="2" charset="0"/>
+                <a:ea typeface="Roboto" panose="02000000000000000000" pitchFamily="2" charset="0"/>
+              </a:rPr>
+              <a:t>List : 		Deze array vul ik met al de kaarten.</a:t>
+            </a:r>
+          </a:p>
+          <a:p>
+            <a:pPr marL="285750" indent="-285750">
+              <a:buFont typeface="Arial" panose="020B0604020202020204" pitchFamily="34" charset="0"/>
+              <a:buChar char="•"/>
+            </a:pPr>
+            <a:r>
+              <a:rPr lang="nl-BE" dirty="0" err="1">
+                <a:latin typeface="Roboto" panose="02000000000000000000" pitchFamily="2" charset="0"/>
+                <a:ea typeface="Roboto" panose="02000000000000000000" pitchFamily="2" charset="0"/>
+              </a:rPr>
+              <a:t>newId</a:t>
+            </a:r>
+            <a:r>
+              <a:rPr lang="nl-BE" dirty="0">
+                <a:latin typeface="Roboto" panose="02000000000000000000" pitchFamily="2" charset="0"/>
+                <a:ea typeface="Roboto" panose="02000000000000000000" pitchFamily="2" charset="0"/>
+              </a:rPr>
+              <a:t> : 	Deze variabele vul ik met de geselecteerde kaart.</a:t>
+            </a:r>
+          </a:p>
+          <a:p>
+            <a:pPr marL="285750" indent="-285750">
+              <a:buFont typeface="Arial" panose="020B0604020202020204" pitchFamily="34" charset="0"/>
+              <a:buChar char="•"/>
+            </a:pPr>
+            <a:r>
+              <a:rPr lang="nl-BE" dirty="0" err="1">
+                <a:latin typeface="Roboto" panose="02000000000000000000" pitchFamily="2" charset="0"/>
+                <a:ea typeface="Roboto" panose="02000000000000000000" pitchFamily="2" charset="0"/>
+              </a:rPr>
+              <a:t>selectedCard</a:t>
+            </a:r>
+            <a:r>
+              <a:rPr lang="nl-BE" dirty="0">
+                <a:latin typeface="Roboto" panose="02000000000000000000" pitchFamily="2" charset="0"/>
+                <a:ea typeface="Roboto" panose="02000000000000000000" pitchFamily="2" charset="0"/>
+              </a:rPr>
+              <a:t> : 	Deze variabele vul ik met het geselecteerde kaart object.</a:t>
+            </a:r>
+          </a:p>
+          <a:p>
+            <a:pPr marL="285750" indent="-285750">
+              <a:buFont typeface="Arial" panose="020B0604020202020204" pitchFamily="34" charset="0"/>
+              <a:buChar char="•"/>
+            </a:pPr>
+            <a:r>
+              <a:rPr lang="nl-BE" dirty="0" err="1">
+                <a:latin typeface="Roboto" panose="02000000000000000000" pitchFamily="2" charset="0"/>
+                <a:ea typeface="Roboto" panose="02000000000000000000" pitchFamily="2" charset="0"/>
+              </a:rPr>
+              <a:t>newTitle</a:t>
+            </a:r>
+            <a:r>
+              <a:rPr lang="nl-BE" dirty="0">
+                <a:latin typeface="Roboto" panose="02000000000000000000" pitchFamily="2" charset="0"/>
+                <a:ea typeface="Roboto" panose="02000000000000000000" pitchFamily="2" charset="0"/>
+              </a:rPr>
+              <a:t> : 	Deze variabele vul ik met de nieuw aangemaakte titel voor een update.</a:t>
+            </a:r>
+          </a:p>
+          <a:p>
+            <a:pPr marL="285750" indent="-285750">
+              <a:buFont typeface="Arial" panose="020B0604020202020204" pitchFamily="34" charset="0"/>
+              <a:buChar char="•"/>
+            </a:pPr>
+            <a:r>
+              <a:rPr lang="nl-BE" dirty="0" err="1">
+                <a:latin typeface="Roboto" panose="02000000000000000000" pitchFamily="2" charset="0"/>
+                <a:ea typeface="Roboto" panose="02000000000000000000" pitchFamily="2" charset="0"/>
+              </a:rPr>
+              <a:t>newBody</a:t>
+            </a:r>
+            <a:r>
+              <a:rPr lang="nl-BE" dirty="0">
+                <a:latin typeface="Roboto" panose="02000000000000000000" pitchFamily="2" charset="0"/>
+                <a:ea typeface="Roboto" panose="02000000000000000000" pitchFamily="2" charset="0"/>
+              </a:rPr>
+              <a:t> : 	Deze variabele vul ik met een nieuw aangemaakte body voor een update. </a:t>
+            </a:r>
+          </a:p>
+        </p:txBody>
+      </p:sp>
+    </p:spTree>
+    <p:extLst>
+      <p:ext uri="{BB962C8B-B14F-4D97-AF65-F5344CB8AC3E}">
+        <p14:creationId xmlns:p14="http://schemas.microsoft.com/office/powerpoint/2010/main" val="1177811798"/>
+      </p:ext>
+    </p:extLst>
+  </p:cSld>
+  <p:clrMapOvr>
+    <a:masterClrMapping/>
+  </p:clrMapOvr>
+</p:sld>
+</file>
+
+<file path=ppt/slides/slide35.xml><?xml version="1.0" encoding="utf-8"?>
+<p:sld xmlns:a="http://schemas.openxmlformats.org/drawingml/2006/main" xmlns:r="http://schemas.openxmlformats.org/officeDocument/2006/relationships" xmlns:p="http://schemas.openxmlformats.org/presentationml/2006/main">
+  <p:cSld>
+    <p:spTree>
+      <p:nvGrpSpPr>
+        <p:cNvPr id="1" name=""/>
+        <p:cNvGrpSpPr/>
+        <p:nvPr/>
+      </p:nvGrpSpPr>
+      <p:grpSpPr>
+        <a:xfrm>
+          <a:off x="0" y="0"/>
+          <a:ext cx="0" cy="0"/>
+          <a:chOff x="0" y="0"/>
+          <a:chExt cx="0" cy="0"/>
+        </a:xfrm>
+      </p:grpSpPr>
+      <p:pic>
+        <p:nvPicPr>
+          <p:cNvPr id="3" name="Afbeelding 2"/>
+          <p:cNvPicPr>
+            <a:picLocks noChangeAspect="1"/>
+          </p:cNvPicPr>
+          <p:nvPr/>
+        </p:nvPicPr>
+        <p:blipFill>
+          <a:blip r:embed="rId2"/>
+          <a:stretch>
+            <a:fillRect/>
+          </a:stretch>
+        </p:blipFill>
+        <p:spPr>
+          <a:xfrm>
+            <a:off x="570451" y="1015023"/>
+            <a:ext cx="2095500" cy="790575"/>
+          </a:xfrm>
+          <a:prstGeom prst="rect">
+            <a:avLst/>
+          </a:prstGeom>
+        </p:spPr>
+      </p:pic>
+      <p:sp>
+        <p:nvSpPr>
+          <p:cNvPr id="4" name="Tekstvak 3"/>
+          <p:cNvSpPr txBox="1"/>
+          <p:nvPr/>
+        </p:nvSpPr>
+        <p:spPr>
+          <a:xfrm>
+            <a:off x="570451" y="269401"/>
+            <a:ext cx="10528184" cy="646331"/>
+          </a:xfrm>
+          <a:prstGeom prst="rect">
+            <a:avLst/>
+          </a:prstGeom>
+          <a:noFill/>
+        </p:spPr>
+        <p:txBody>
+          <a:bodyPr wrap="square" rtlCol="0">
+            <a:spAutoFit/>
+          </a:bodyPr>
+          <a:lstStyle/>
+          <a:p>
+            <a:r>
+              <a:rPr lang="nl-BE" dirty="0">
+                <a:latin typeface="Roboto" panose="02000000000000000000" pitchFamily="2" charset="0"/>
+                <a:ea typeface="Roboto" panose="02000000000000000000" pitchFamily="2" charset="0"/>
+              </a:rPr>
+              <a:t>Eerst gebruik ik de </a:t>
+            </a:r>
+            <a:r>
+              <a:rPr lang="nl-BE" dirty="0" err="1">
+                <a:latin typeface="Roboto" panose="02000000000000000000" pitchFamily="2" charset="0"/>
+                <a:ea typeface="Roboto" panose="02000000000000000000" pitchFamily="2" charset="0"/>
+              </a:rPr>
+              <a:t>lifecycle</a:t>
+            </a:r>
+            <a:r>
+              <a:rPr lang="nl-BE" dirty="0">
+                <a:latin typeface="Roboto" panose="02000000000000000000" pitchFamily="2" charset="0"/>
+                <a:ea typeface="Roboto" panose="02000000000000000000" pitchFamily="2" charset="0"/>
+              </a:rPr>
+              <a:t> </a:t>
+            </a:r>
+            <a:r>
+              <a:rPr lang="nl-BE" dirty="0" err="1">
+                <a:latin typeface="Roboto" panose="02000000000000000000" pitchFamily="2" charset="0"/>
+                <a:ea typeface="Roboto" panose="02000000000000000000" pitchFamily="2" charset="0"/>
+              </a:rPr>
+              <a:t>hook</a:t>
+            </a:r>
+            <a:r>
+              <a:rPr lang="nl-BE" dirty="0">
+                <a:latin typeface="Roboto" panose="02000000000000000000" pitchFamily="2" charset="0"/>
+                <a:ea typeface="Roboto" panose="02000000000000000000" pitchFamily="2" charset="0"/>
+              </a:rPr>
+              <a:t> “</a:t>
+            </a:r>
+            <a:r>
+              <a:rPr lang="nl-BE" dirty="0" err="1">
+                <a:latin typeface="Roboto" panose="02000000000000000000" pitchFamily="2" charset="0"/>
+                <a:ea typeface="Roboto" panose="02000000000000000000" pitchFamily="2" charset="0"/>
+              </a:rPr>
+              <a:t>created</a:t>
+            </a:r>
+            <a:r>
+              <a:rPr lang="nl-BE" dirty="0">
+                <a:latin typeface="Roboto" panose="02000000000000000000" pitchFamily="2" charset="0"/>
+                <a:ea typeface="Roboto" panose="02000000000000000000" pitchFamily="2" charset="0"/>
+              </a:rPr>
+              <a:t>”. Deze functie zal laden als de component aangemaakt is.</a:t>
+            </a:r>
+          </a:p>
+          <a:p>
+            <a:endParaRPr lang="nl-BE" dirty="0">
+              <a:latin typeface="Roboto" panose="02000000000000000000" pitchFamily="2" charset="0"/>
+              <a:ea typeface="Roboto" panose="02000000000000000000" pitchFamily="2" charset="0"/>
+            </a:endParaRPr>
+          </a:p>
+        </p:txBody>
+      </p:sp>
+      <p:pic>
+        <p:nvPicPr>
+          <p:cNvPr id="5" name="Afbeelding 4"/>
+          <p:cNvPicPr>
+            <a:picLocks noChangeAspect="1"/>
+          </p:cNvPicPr>
+          <p:nvPr/>
+        </p:nvPicPr>
+        <p:blipFill>
+          <a:blip r:embed="rId3"/>
+          <a:stretch>
+            <a:fillRect/>
+          </a:stretch>
+        </p:blipFill>
+        <p:spPr>
+          <a:xfrm>
+            <a:off x="570451" y="2555759"/>
+            <a:ext cx="4143375" cy="1257300"/>
+          </a:xfrm>
+          <a:prstGeom prst="rect">
+            <a:avLst/>
+          </a:prstGeom>
+        </p:spPr>
+      </p:pic>
+      <p:sp>
+        <p:nvSpPr>
+          <p:cNvPr id="6" name="Rechthoek 5"/>
+          <p:cNvSpPr/>
+          <p:nvPr/>
+        </p:nvSpPr>
+        <p:spPr>
+          <a:xfrm>
+            <a:off x="570451" y="2002545"/>
+            <a:ext cx="10528184" cy="369332"/>
+          </a:xfrm>
+          <a:prstGeom prst="rect">
+            <a:avLst/>
+          </a:prstGeom>
+        </p:spPr>
+        <p:txBody>
+          <a:bodyPr wrap="square">
+            <a:spAutoFit/>
+          </a:bodyPr>
+          <a:lstStyle/>
+          <a:p>
+            <a:r>
+              <a:rPr lang="nl-BE" dirty="0">
+                <a:latin typeface="Roboto" panose="02000000000000000000" pitchFamily="2" charset="0"/>
+                <a:ea typeface="Roboto" panose="02000000000000000000" pitchFamily="2" charset="0"/>
+              </a:rPr>
+              <a:t>De </a:t>
+            </a:r>
+            <a:r>
+              <a:rPr lang="nl-BE" dirty="0" err="1">
+                <a:latin typeface="Roboto" panose="02000000000000000000" pitchFamily="2" charset="0"/>
+                <a:ea typeface="Roboto" panose="02000000000000000000" pitchFamily="2" charset="0"/>
+              </a:rPr>
+              <a:t>created</a:t>
+            </a:r>
+            <a:r>
+              <a:rPr lang="nl-BE" dirty="0">
+                <a:latin typeface="Roboto" panose="02000000000000000000" pitchFamily="2" charset="0"/>
+                <a:ea typeface="Roboto" panose="02000000000000000000" pitchFamily="2" charset="0"/>
+              </a:rPr>
+              <a:t> functie roept op zijn beurt een methode op “update”.</a:t>
+            </a:r>
+            <a:endParaRPr lang="nl-BE" dirty="0"/>
+          </a:p>
+        </p:txBody>
+      </p:sp>
+      <p:pic>
+        <p:nvPicPr>
+          <p:cNvPr id="7" name="Afbeelding 6"/>
+          <p:cNvPicPr>
+            <a:picLocks noChangeAspect="1"/>
+          </p:cNvPicPr>
+          <p:nvPr/>
+        </p:nvPicPr>
+        <p:blipFill>
+          <a:blip r:embed="rId4"/>
+          <a:stretch>
+            <a:fillRect/>
+          </a:stretch>
+        </p:blipFill>
+        <p:spPr>
+          <a:xfrm>
+            <a:off x="570451" y="5269204"/>
+            <a:ext cx="7600950" cy="1285875"/>
+          </a:xfrm>
+          <a:prstGeom prst="rect">
+            <a:avLst/>
+          </a:prstGeom>
+        </p:spPr>
+      </p:pic>
+      <p:sp>
+        <p:nvSpPr>
+          <p:cNvPr id="8" name="Tekstvak 7"/>
+          <p:cNvSpPr txBox="1"/>
+          <p:nvPr/>
+        </p:nvSpPr>
+        <p:spPr>
+          <a:xfrm>
+            <a:off x="570451" y="4194495"/>
+            <a:ext cx="10687575" cy="646331"/>
+          </a:xfrm>
+          <a:prstGeom prst="rect">
+            <a:avLst/>
+          </a:prstGeom>
+          <a:noFill/>
+        </p:spPr>
+        <p:txBody>
+          <a:bodyPr wrap="square" rtlCol="0">
+            <a:spAutoFit/>
+          </a:bodyPr>
+          <a:lstStyle/>
+          <a:p>
+            <a:r>
+              <a:rPr lang="nl-BE" dirty="0">
+                <a:latin typeface="Roboto" panose="02000000000000000000" pitchFamily="2" charset="0"/>
+                <a:ea typeface="Roboto" panose="02000000000000000000" pitchFamily="2" charset="0"/>
+              </a:rPr>
+              <a:t>Zoals je kan zien in de template loop ik door de list variabele die ik gevuld heb met de data die ik terug heb gekregen van de </a:t>
+            </a:r>
+            <a:r>
+              <a:rPr lang="nl-BE" dirty="0" err="1">
+                <a:latin typeface="Roboto" panose="02000000000000000000" pitchFamily="2" charset="0"/>
+                <a:ea typeface="Roboto" panose="02000000000000000000" pitchFamily="2" charset="0"/>
+              </a:rPr>
+              <a:t>ajax</a:t>
+            </a:r>
+            <a:r>
+              <a:rPr lang="nl-BE" dirty="0">
+                <a:latin typeface="Roboto" panose="02000000000000000000" pitchFamily="2" charset="0"/>
+                <a:ea typeface="Roboto" panose="02000000000000000000" pitchFamily="2" charset="0"/>
+              </a:rPr>
+              <a:t> </a:t>
+            </a:r>
+            <a:r>
+              <a:rPr lang="nl-BE" dirty="0" err="1">
+                <a:latin typeface="Roboto" panose="02000000000000000000" pitchFamily="2" charset="0"/>
+                <a:ea typeface="Roboto" panose="02000000000000000000" pitchFamily="2" charset="0"/>
+              </a:rPr>
+              <a:t>request</a:t>
+            </a:r>
+            <a:r>
+              <a:rPr lang="nl-BE" dirty="0">
+                <a:latin typeface="Roboto" panose="02000000000000000000" pitchFamily="2" charset="0"/>
+                <a:ea typeface="Roboto" panose="02000000000000000000" pitchFamily="2" charset="0"/>
+              </a:rPr>
+              <a:t>.</a:t>
+            </a:r>
+          </a:p>
+        </p:txBody>
+      </p:sp>
+      <p:sp>
+        <p:nvSpPr>
+          <p:cNvPr id="9" name="Tekstvak 8"/>
+          <p:cNvSpPr txBox="1"/>
+          <p:nvPr/>
+        </p:nvSpPr>
+        <p:spPr>
+          <a:xfrm>
+            <a:off x="8615494" y="5269204"/>
+            <a:ext cx="2919368" cy="1200329"/>
+          </a:xfrm>
+          <a:prstGeom prst="rect">
+            <a:avLst/>
+          </a:prstGeom>
+          <a:noFill/>
+        </p:spPr>
+        <p:txBody>
+          <a:bodyPr wrap="square" rtlCol="0">
+            <a:spAutoFit/>
+          </a:bodyPr>
+          <a:lstStyle/>
+          <a:p>
+            <a:r>
+              <a:rPr lang="nl-BE" dirty="0">
+                <a:latin typeface="Roboto" panose="02000000000000000000" pitchFamily="2" charset="0"/>
+                <a:ea typeface="Roboto" panose="02000000000000000000" pitchFamily="2" charset="0"/>
+              </a:rPr>
+              <a:t>Er staat @{{</a:t>
+            </a:r>
+            <a:r>
+              <a:rPr lang="nl-BE" dirty="0" err="1">
+                <a:latin typeface="Roboto" panose="02000000000000000000" pitchFamily="2" charset="0"/>
+                <a:ea typeface="Roboto" panose="02000000000000000000" pitchFamily="2" charset="0"/>
+              </a:rPr>
+              <a:t>card.title</a:t>
+            </a:r>
+            <a:r>
+              <a:rPr lang="nl-BE" dirty="0">
+                <a:latin typeface="Roboto" panose="02000000000000000000" pitchFamily="2" charset="0"/>
+                <a:ea typeface="Roboto" panose="02000000000000000000" pitchFamily="2" charset="0"/>
+              </a:rPr>
+              <a:t>}} omdat er anders een conflict is met de </a:t>
+            </a:r>
+            <a:r>
+              <a:rPr lang="nl-BE" dirty="0" err="1">
+                <a:latin typeface="Roboto" panose="02000000000000000000" pitchFamily="2" charset="0"/>
+                <a:ea typeface="Roboto" panose="02000000000000000000" pitchFamily="2" charset="0"/>
+              </a:rPr>
+              <a:t>laravel</a:t>
+            </a:r>
+            <a:r>
+              <a:rPr lang="nl-BE" dirty="0">
+                <a:latin typeface="Roboto" panose="02000000000000000000" pitchFamily="2" charset="0"/>
+                <a:ea typeface="Roboto" panose="02000000000000000000" pitchFamily="2" charset="0"/>
+              </a:rPr>
+              <a:t> </a:t>
+            </a:r>
+            <a:r>
+              <a:rPr lang="nl-BE" dirty="0" err="1">
+                <a:latin typeface="Roboto" panose="02000000000000000000" pitchFamily="2" charset="0"/>
+                <a:ea typeface="Roboto" panose="02000000000000000000" pitchFamily="2" charset="0"/>
+              </a:rPr>
+              <a:t>blade</a:t>
+            </a:r>
+            <a:r>
+              <a:rPr lang="nl-BE" dirty="0">
+                <a:latin typeface="Roboto" panose="02000000000000000000" pitchFamily="2" charset="0"/>
+                <a:ea typeface="Roboto" panose="02000000000000000000" pitchFamily="2" charset="0"/>
+              </a:rPr>
+              <a:t> syntax.</a:t>
+            </a:r>
+          </a:p>
+        </p:txBody>
+      </p:sp>
+    </p:spTree>
+    <p:extLst>
+      <p:ext uri="{BB962C8B-B14F-4D97-AF65-F5344CB8AC3E}">
+        <p14:creationId xmlns:p14="http://schemas.microsoft.com/office/powerpoint/2010/main" val="140324604"/>
+      </p:ext>
+    </p:extLst>
+  </p:cSld>
+  <p:clrMapOvr>
+    <a:masterClrMapping/>
+  </p:clrMapOvr>
+</p:sld>
+</file>
+
+<file path=ppt/slides/slide36.xml><?xml version="1.0" encoding="utf-8"?>
+<p:sld xmlns:a="http://schemas.openxmlformats.org/drawingml/2006/main" xmlns:r="http://schemas.openxmlformats.org/officeDocument/2006/relationships" xmlns:p="http://schemas.openxmlformats.org/presentationml/2006/main">
+  <p:cSld>
+    <p:spTree>
+      <p:nvGrpSpPr>
+        <p:cNvPr id="1" name=""/>
+        <p:cNvGrpSpPr/>
+        <p:nvPr/>
+      </p:nvGrpSpPr>
+      <p:grpSpPr>
+        <a:xfrm>
+          <a:off x="0" y="0"/>
+          <a:ext cx="0" cy="0"/>
+          <a:chOff x="0" y="0"/>
+          <a:chExt cx="0" cy="0"/>
+        </a:xfrm>
+      </p:grpSpPr>
+      <p:sp>
+        <p:nvSpPr>
+          <p:cNvPr id="3" name="Tekstvak 2"/>
+          <p:cNvSpPr txBox="1"/>
+          <p:nvPr/>
+        </p:nvSpPr>
+        <p:spPr>
+          <a:xfrm>
+            <a:off x="654341" y="394283"/>
+            <a:ext cx="10645630" cy="646331"/>
+          </a:xfrm>
+          <a:prstGeom prst="rect">
+            <a:avLst/>
+          </a:prstGeom>
+          <a:noFill/>
+        </p:spPr>
+        <p:txBody>
+          <a:bodyPr wrap="square" rtlCol="0">
+            <a:spAutoFit/>
+          </a:bodyPr>
+          <a:lstStyle/>
+          <a:p>
+            <a:r>
+              <a:rPr lang="nl-BE" dirty="0">
+                <a:latin typeface="Roboto" panose="02000000000000000000" pitchFamily="2" charset="0"/>
+                <a:ea typeface="Roboto" panose="02000000000000000000" pitchFamily="2" charset="0"/>
+              </a:rPr>
+              <a:t>Je zag ook in de template dat er naar een click event wordt geluisterd. Deze click event roept de “</a:t>
+            </a:r>
+            <a:r>
+              <a:rPr lang="nl-BE" dirty="0" err="1">
+                <a:latin typeface="Roboto" panose="02000000000000000000" pitchFamily="2" charset="0"/>
+                <a:ea typeface="Roboto" panose="02000000000000000000" pitchFamily="2" charset="0"/>
+              </a:rPr>
+              <a:t>changeId</a:t>
+            </a:r>
+            <a:r>
+              <a:rPr lang="nl-BE" dirty="0">
+                <a:latin typeface="Roboto" panose="02000000000000000000" pitchFamily="2" charset="0"/>
+                <a:ea typeface="Roboto" panose="02000000000000000000" pitchFamily="2" charset="0"/>
+              </a:rPr>
+              <a:t>” functie op.</a:t>
+            </a:r>
+          </a:p>
+        </p:txBody>
+      </p:sp>
+      <p:pic>
+        <p:nvPicPr>
+          <p:cNvPr id="4" name="Afbeelding 3"/>
+          <p:cNvPicPr>
+            <a:picLocks noChangeAspect="1"/>
+          </p:cNvPicPr>
+          <p:nvPr/>
+        </p:nvPicPr>
+        <p:blipFill>
+          <a:blip r:embed="rId2"/>
+          <a:stretch>
+            <a:fillRect/>
+          </a:stretch>
+        </p:blipFill>
+        <p:spPr>
+          <a:xfrm>
+            <a:off x="654341" y="1461038"/>
+            <a:ext cx="4295775" cy="1419225"/>
+          </a:xfrm>
+          <a:prstGeom prst="rect">
+            <a:avLst/>
+          </a:prstGeom>
+        </p:spPr>
+      </p:pic>
+      <p:sp>
+        <p:nvSpPr>
+          <p:cNvPr id="5" name="Tekstvak 4"/>
+          <p:cNvSpPr txBox="1"/>
+          <p:nvPr/>
+        </p:nvSpPr>
+        <p:spPr>
+          <a:xfrm>
+            <a:off x="5561901" y="1461038"/>
+            <a:ext cx="5553512" cy="1477328"/>
+          </a:xfrm>
+          <a:prstGeom prst="rect">
+            <a:avLst/>
+          </a:prstGeom>
+          <a:noFill/>
+        </p:spPr>
+        <p:txBody>
+          <a:bodyPr wrap="square" rtlCol="0">
+            <a:spAutoFit/>
+          </a:bodyPr>
+          <a:lstStyle/>
+          <a:p>
+            <a:r>
+              <a:rPr lang="nl-BE" dirty="0">
+                <a:latin typeface="Roboto" panose="02000000000000000000" pitchFamily="2" charset="0"/>
+                <a:ea typeface="Roboto" panose="02000000000000000000" pitchFamily="2" charset="0"/>
+              </a:rPr>
+              <a:t>Deze functie krijgt ook een </a:t>
+            </a:r>
+            <a:r>
+              <a:rPr lang="nl-BE" dirty="0" err="1">
+                <a:latin typeface="Roboto" panose="02000000000000000000" pitchFamily="2" charset="0"/>
+                <a:ea typeface="Roboto" panose="02000000000000000000" pitchFamily="2" charset="0"/>
+              </a:rPr>
+              <a:t>value</a:t>
+            </a:r>
+            <a:r>
+              <a:rPr lang="nl-BE" dirty="0">
+                <a:latin typeface="Roboto" panose="02000000000000000000" pitchFamily="2" charset="0"/>
+                <a:ea typeface="Roboto" panose="02000000000000000000" pitchFamily="2" charset="0"/>
+              </a:rPr>
+              <a:t> mee om de “</a:t>
+            </a:r>
+            <a:r>
+              <a:rPr lang="nl-BE" dirty="0" err="1">
+                <a:latin typeface="Roboto" panose="02000000000000000000" pitchFamily="2" charset="0"/>
+                <a:ea typeface="Roboto" panose="02000000000000000000" pitchFamily="2" charset="0"/>
+              </a:rPr>
+              <a:t>newId</a:t>
+            </a:r>
+            <a:r>
+              <a:rPr lang="nl-BE" dirty="0">
+                <a:latin typeface="Roboto" panose="02000000000000000000" pitchFamily="2" charset="0"/>
+                <a:ea typeface="Roboto" panose="02000000000000000000" pitchFamily="2" charset="0"/>
+              </a:rPr>
+              <a:t>” variabele te wijzigen naar de aangeklikte kaart.</a:t>
+            </a:r>
+          </a:p>
+          <a:p>
+            <a:endParaRPr lang="nl-BE" dirty="0">
+              <a:latin typeface="Roboto" panose="02000000000000000000" pitchFamily="2" charset="0"/>
+              <a:ea typeface="Roboto" panose="02000000000000000000" pitchFamily="2" charset="0"/>
+            </a:endParaRPr>
+          </a:p>
+          <a:p>
+            <a:r>
+              <a:rPr lang="nl-BE" dirty="0">
+                <a:latin typeface="Roboto" panose="02000000000000000000" pitchFamily="2" charset="0"/>
+                <a:ea typeface="Roboto" panose="02000000000000000000" pitchFamily="2" charset="0"/>
+              </a:rPr>
+              <a:t>Deze functie roept dan de informatie op over de aangeklikte kaart met een </a:t>
+            </a:r>
+            <a:r>
+              <a:rPr lang="nl-BE" dirty="0" err="1">
+                <a:latin typeface="Roboto" panose="02000000000000000000" pitchFamily="2" charset="0"/>
+                <a:ea typeface="Roboto" panose="02000000000000000000" pitchFamily="2" charset="0"/>
+              </a:rPr>
+              <a:t>json</a:t>
+            </a:r>
+            <a:r>
+              <a:rPr lang="nl-BE" dirty="0">
+                <a:latin typeface="Roboto" panose="02000000000000000000" pitchFamily="2" charset="0"/>
+                <a:ea typeface="Roboto" panose="02000000000000000000" pitchFamily="2" charset="0"/>
+              </a:rPr>
+              <a:t> </a:t>
+            </a:r>
+            <a:r>
+              <a:rPr lang="nl-BE" dirty="0" err="1">
+                <a:latin typeface="Roboto" panose="02000000000000000000" pitchFamily="2" charset="0"/>
+                <a:ea typeface="Roboto" panose="02000000000000000000" pitchFamily="2" charset="0"/>
+              </a:rPr>
+              <a:t>request</a:t>
+            </a:r>
+            <a:r>
+              <a:rPr lang="nl-BE" dirty="0">
+                <a:latin typeface="Roboto" panose="02000000000000000000" pitchFamily="2" charset="0"/>
+                <a:ea typeface="Roboto" panose="02000000000000000000" pitchFamily="2" charset="0"/>
+              </a:rPr>
+              <a:t>.</a:t>
+            </a:r>
+          </a:p>
+        </p:txBody>
+      </p:sp>
+      <p:pic>
+        <p:nvPicPr>
+          <p:cNvPr id="6" name="Afbeelding 5"/>
+          <p:cNvPicPr>
+            <a:picLocks noChangeAspect="1"/>
+          </p:cNvPicPr>
+          <p:nvPr/>
+        </p:nvPicPr>
+        <p:blipFill>
+          <a:blip r:embed="rId3"/>
+          <a:stretch>
+            <a:fillRect/>
+          </a:stretch>
+        </p:blipFill>
+        <p:spPr>
+          <a:xfrm>
+            <a:off x="562063" y="4426866"/>
+            <a:ext cx="4029075" cy="885825"/>
+          </a:xfrm>
+          <a:prstGeom prst="rect">
+            <a:avLst/>
+          </a:prstGeom>
+        </p:spPr>
+      </p:pic>
+      <p:sp>
+        <p:nvSpPr>
+          <p:cNvPr id="7" name="Tekstvak 6"/>
+          <p:cNvSpPr txBox="1"/>
+          <p:nvPr/>
+        </p:nvSpPr>
+        <p:spPr>
+          <a:xfrm>
+            <a:off x="562063" y="3473042"/>
+            <a:ext cx="10226180" cy="646331"/>
+          </a:xfrm>
+          <a:prstGeom prst="rect">
+            <a:avLst/>
+          </a:prstGeom>
+          <a:noFill/>
+        </p:spPr>
+        <p:txBody>
+          <a:bodyPr wrap="square" rtlCol="0">
+            <a:spAutoFit/>
+          </a:bodyPr>
+          <a:lstStyle/>
+          <a:p>
+            <a:r>
+              <a:rPr lang="nl-BE" dirty="0">
+                <a:latin typeface="Roboto" panose="02000000000000000000" pitchFamily="2" charset="0"/>
+                <a:ea typeface="Roboto" panose="02000000000000000000" pitchFamily="2" charset="0"/>
+              </a:rPr>
+              <a:t>De aangeklikte kaart wordt getoond in de template. Deze template wordt enkel geladen als er een kaart geselecteerd is met behulp van “</a:t>
+            </a:r>
+            <a:r>
+              <a:rPr lang="nl-BE" dirty="0" err="1">
+                <a:latin typeface="Roboto" panose="02000000000000000000" pitchFamily="2" charset="0"/>
+                <a:ea typeface="Roboto" panose="02000000000000000000" pitchFamily="2" charset="0"/>
+              </a:rPr>
+              <a:t>v-if</a:t>
+            </a:r>
+            <a:r>
+              <a:rPr lang="nl-BE" dirty="0">
+                <a:latin typeface="Roboto" panose="02000000000000000000" pitchFamily="2" charset="0"/>
+                <a:ea typeface="Roboto" panose="02000000000000000000" pitchFamily="2" charset="0"/>
+              </a:rPr>
+              <a:t>”,</a:t>
+            </a:r>
+          </a:p>
+        </p:txBody>
+      </p:sp>
+    </p:spTree>
+    <p:extLst>
+      <p:ext uri="{BB962C8B-B14F-4D97-AF65-F5344CB8AC3E}">
+        <p14:creationId xmlns:p14="http://schemas.microsoft.com/office/powerpoint/2010/main" val="583061344"/>
+      </p:ext>
+    </p:extLst>
+  </p:cSld>
+  <p:clrMapOvr>
+    <a:masterClrMapping/>
+  </p:clrMapOvr>
+</p:sld>
+</file>
+
+<file path=ppt/slides/slide37.xml><?xml version="1.0" encoding="utf-8"?>
+<p:sld xmlns:a="http://schemas.openxmlformats.org/drawingml/2006/main" xmlns:r="http://schemas.openxmlformats.org/officeDocument/2006/relationships" xmlns:p="http://schemas.openxmlformats.org/presentationml/2006/main">
+  <p:cSld>
+    <p:spTree>
+      <p:nvGrpSpPr>
+        <p:cNvPr id="1" name=""/>
+        <p:cNvGrpSpPr/>
+        <p:nvPr/>
+      </p:nvGrpSpPr>
+      <p:grpSpPr>
+        <a:xfrm>
+          <a:off x="0" y="0"/>
+          <a:ext cx="0" cy="0"/>
+          <a:chOff x="0" y="0"/>
+          <a:chExt cx="0" cy="0"/>
+        </a:xfrm>
+      </p:grpSpPr>
+      <p:pic>
+        <p:nvPicPr>
+          <p:cNvPr id="3" name="Afbeelding 2"/>
+          <p:cNvPicPr>
+            <a:picLocks noChangeAspect="1"/>
+          </p:cNvPicPr>
+          <p:nvPr/>
+        </p:nvPicPr>
+        <p:blipFill>
+          <a:blip r:embed="rId2"/>
+          <a:stretch>
+            <a:fillRect/>
+          </a:stretch>
+        </p:blipFill>
+        <p:spPr>
+          <a:xfrm>
+            <a:off x="679508" y="4598614"/>
+            <a:ext cx="8715375" cy="1400175"/>
+          </a:xfrm>
+          <a:prstGeom prst="rect">
+            <a:avLst/>
+          </a:prstGeom>
+        </p:spPr>
+      </p:pic>
+      <p:sp>
+        <p:nvSpPr>
+          <p:cNvPr id="5" name="Tekstvak 4"/>
+          <p:cNvSpPr txBox="1"/>
+          <p:nvPr/>
+        </p:nvSpPr>
+        <p:spPr>
+          <a:xfrm>
+            <a:off x="679508" y="285226"/>
+            <a:ext cx="10687575" cy="646331"/>
+          </a:xfrm>
+          <a:prstGeom prst="rect">
+            <a:avLst/>
+          </a:prstGeom>
+          <a:noFill/>
+        </p:spPr>
+        <p:txBody>
+          <a:bodyPr wrap="square" rtlCol="0">
+            <a:spAutoFit/>
+          </a:bodyPr>
+          <a:lstStyle/>
+          <a:p>
+            <a:r>
+              <a:rPr lang="nl-BE" dirty="0">
+                <a:latin typeface="Roboto" panose="02000000000000000000" pitchFamily="2" charset="0"/>
+                <a:ea typeface="Roboto" panose="02000000000000000000" pitchFamily="2" charset="0"/>
+              </a:rPr>
+              <a:t>In het laatste deel van de template staan een paar input fields die gelinkt zijn met een variabele met </a:t>
+            </a:r>
+          </a:p>
+          <a:p>
+            <a:r>
+              <a:rPr lang="nl-BE" dirty="0">
+                <a:latin typeface="Roboto" panose="02000000000000000000" pitchFamily="2" charset="0"/>
+                <a:ea typeface="Roboto" panose="02000000000000000000" pitchFamily="2" charset="0"/>
+              </a:rPr>
+              <a:t>“v-model”. Er staat ook een “</a:t>
+            </a:r>
+            <a:r>
+              <a:rPr lang="nl-BE" dirty="0" err="1">
+                <a:latin typeface="Roboto" panose="02000000000000000000" pitchFamily="2" charset="0"/>
+                <a:ea typeface="Roboto" panose="02000000000000000000" pitchFamily="2" charset="0"/>
+              </a:rPr>
+              <a:t>crsf_token</a:t>
+            </a:r>
+            <a:r>
+              <a:rPr lang="nl-BE" dirty="0">
+                <a:latin typeface="Roboto" panose="02000000000000000000" pitchFamily="2" charset="0"/>
+                <a:ea typeface="Roboto" panose="02000000000000000000" pitchFamily="2" charset="0"/>
+              </a:rPr>
+              <a:t>” in dit is enkel voor </a:t>
+            </a:r>
+            <a:r>
+              <a:rPr lang="nl-BE" dirty="0" err="1">
+                <a:latin typeface="Roboto" panose="02000000000000000000" pitchFamily="2" charset="0"/>
+                <a:ea typeface="Roboto" panose="02000000000000000000" pitchFamily="2" charset="0"/>
+              </a:rPr>
+              <a:t>laravel</a:t>
+            </a:r>
+            <a:r>
+              <a:rPr lang="nl-BE" dirty="0">
+                <a:latin typeface="Roboto" panose="02000000000000000000" pitchFamily="2" charset="0"/>
+                <a:ea typeface="Roboto" panose="02000000000000000000" pitchFamily="2" charset="0"/>
+              </a:rPr>
+              <a:t>. </a:t>
+            </a:r>
+          </a:p>
+        </p:txBody>
+      </p:sp>
+      <p:pic>
+        <p:nvPicPr>
+          <p:cNvPr id="6" name="Afbeelding 5"/>
+          <p:cNvPicPr>
+            <a:picLocks noChangeAspect="1"/>
+          </p:cNvPicPr>
+          <p:nvPr/>
+        </p:nvPicPr>
+        <p:blipFill>
+          <a:blip r:embed="rId3"/>
+          <a:stretch>
+            <a:fillRect/>
+          </a:stretch>
+        </p:blipFill>
+        <p:spPr>
+          <a:xfrm>
+            <a:off x="679508" y="1028822"/>
+            <a:ext cx="6191250" cy="1971675"/>
+          </a:xfrm>
+          <a:prstGeom prst="rect">
+            <a:avLst/>
+          </a:prstGeom>
+        </p:spPr>
+      </p:pic>
+      <p:sp>
+        <p:nvSpPr>
+          <p:cNvPr id="8" name="Tekstvak 7"/>
+          <p:cNvSpPr txBox="1"/>
+          <p:nvPr/>
+        </p:nvSpPr>
+        <p:spPr>
+          <a:xfrm>
+            <a:off x="679508" y="3229762"/>
+            <a:ext cx="10872132" cy="1200329"/>
+          </a:xfrm>
+          <a:prstGeom prst="rect">
+            <a:avLst/>
+          </a:prstGeom>
+          <a:noFill/>
+        </p:spPr>
+        <p:txBody>
+          <a:bodyPr wrap="square" rtlCol="0">
+            <a:spAutoFit/>
+          </a:bodyPr>
+          <a:lstStyle/>
+          <a:p>
+            <a:r>
+              <a:rPr lang="nl-BE" dirty="0">
+                <a:latin typeface="Roboto" panose="02000000000000000000" pitchFamily="2" charset="0"/>
+                <a:ea typeface="Roboto" panose="02000000000000000000" pitchFamily="2" charset="0"/>
+              </a:rPr>
+              <a:t>De laatste functie die gebruikt wordt is de </a:t>
+            </a:r>
+            <a:r>
+              <a:rPr lang="nl-BE" dirty="0" err="1">
+                <a:latin typeface="Roboto" panose="02000000000000000000" pitchFamily="2" charset="0"/>
+                <a:ea typeface="Roboto" panose="02000000000000000000" pitchFamily="2" charset="0"/>
+              </a:rPr>
+              <a:t>addCard</a:t>
+            </a:r>
+            <a:r>
+              <a:rPr lang="nl-BE" dirty="0">
+                <a:latin typeface="Roboto" panose="02000000000000000000" pitchFamily="2" charset="0"/>
+                <a:ea typeface="Roboto" panose="02000000000000000000" pitchFamily="2" charset="0"/>
+              </a:rPr>
+              <a:t> functie. Deze functie wordt opgeroepen bij het klikken op de “voeg toe” knop. </a:t>
+            </a:r>
+          </a:p>
+          <a:p>
+            <a:r>
+              <a:rPr lang="nl-BE" dirty="0">
+                <a:latin typeface="Roboto" panose="02000000000000000000" pitchFamily="2" charset="0"/>
+                <a:ea typeface="Roboto" panose="02000000000000000000" pitchFamily="2" charset="0"/>
+              </a:rPr>
+              <a:t>Er wordt een post gedaan met de juiste info en erna wordt er een update gedaan om de wijzigingen te tonen.</a:t>
+            </a:r>
+          </a:p>
+        </p:txBody>
+      </p:sp>
+      <p:sp>
+        <p:nvSpPr>
+          <p:cNvPr id="9" name="Tekstvak 8"/>
+          <p:cNvSpPr txBox="1"/>
+          <p:nvPr/>
+        </p:nvSpPr>
+        <p:spPr>
+          <a:xfrm>
+            <a:off x="679508" y="6258187"/>
+            <a:ext cx="10570129" cy="369332"/>
+          </a:xfrm>
+          <a:prstGeom prst="rect">
+            <a:avLst/>
+          </a:prstGeom>
+          <a:noFill/>
+        </p:spPr>
+        <p:txBody>
+          <a:bodyPr wrap="square" rtlCol="0">
+            <a:spAutoFit/>
+          </a:bodyPr>
+          <a:lstStyle/>
+          <a:p>
+            <a:r>
+              <a:rPr lang="nl-BE" dirty="0"/>
+              <a:t>Nu zou het moeten werken.</a:t>
+            </a:r>
+          </a:p>
+        </p:txBody>
+      </p:sp>
+    </p:spTree>
+    <p:extLst>
+      <p:ext uri="{BB962C8B-B14F-4D97-AF65-F5344CB8AC3E}">
+        <p14:creationId xmlns:p14="http://schemas.microsoft.com/office/powerpoint/2010/main" val="2209161408"/>
+      </p:ext>
+    </p:extLst>
+  </p:cSld>
+  <p:clrMapOvr>
+    <a:masterClrMapping/>
+  </p:clrMapOvr>
+</p:sld>
+</file>
+
+<file path=ppt/slides/slide38.xml><?xml version="1.0" encoding="utf-8"?>
 <p:sld xmlns:a="http://schemas.openxmlformats.org/drawingml/2006/main" xmlns:r="http://schemas.openxmlformats.org/officeDocument/2006/relationships" xmlns:p="http://schemas.openxmlformats.org/presentationml/2006/main">
   <p:cSld>
     <p:spTree>

</xml_diff>